<commit_message>
powerpoint avec image masque 2
</commit_message>
<xml_diff>
--- a/Notre rapport/Ratés et réussites.pptx
+++ b/Notre rapport/Ratés et réussites.pptx
@@ -8,6 +8,7 @@
     <p:sldId id="256" r:id="rId2"/>
     <p:sldId id="258" r:id="rId3"/>
     <p:sldId id="257" r:id="rId4"/>
+    <p:sldId id="259" r:id="rId5"/>
   </p:sldIdLst>
   <p:sldSz cx="12192000" cy="6858000"/>
   <p:notesSz cx="6858000" cy="9144000"/>
@@ -106,7 +107,24 @@
       </a:defRPr>
     </a:lvl9pPr>
   </p:defaultTextStyle>
+  <p:extLst>
+    <p:ext uri="{EFAFB233-063F-42B5-8137-9DF3F51BA10A}">
+      <p15:sldGuideLst xmlns:p15="http://schemas.microsoft.com/office/powerpoint/2012/main"/>
+    </p:ext>
+  </p:extLst>
 </p:presentation>
+</file>
+
+<file path=ppt/commentAuthors.xml><?xml version="1.0" encoding="utf-8"?>
+<p:cmAuthorLst xmlns:a="http://schemas.openxmlformats.org/drawingml/2006/main" xmlns:r="http://schemas.openxmlformats.org/officeDocument/2006/relationships" xmlns:p="http://schemas.openxmlformats.org/presentationml/2006/main">
+  <p:cmAuthor id="1" name="Nassime Jamadi" initials="NJ" lastIdx="1" clrIdx="0">
+    <p:extLst>
+      <p:ext uri="{19B8F6BF-5375-455C-9EA6-DF929625EA0E}">
+        <p15:presenceInfo xmlns:p15="http://schemas.microsoft.com/office/powerpoint/2012/main" userId="04c5cdf9ace0d00d" providerId="Windows Live"/>
+      </p:ext>
+    </p:extLst>
+  </p:cmAuthor>
+</p:cmAuthorLst>
 </file>
 
 <file path=ppt/slideLayouts/slideLayout1.xml><?xml version="1.0" encoding="utf-8"?>
@@ -3665,6 +3683,1048 @@
 </p:sld>
 </file>
 
+<file path=ppt/slides/slide4.xml><?xml version="1.0" encoding="utf-8"?>
+<p:sld xmlns:a="http://schemas.openxmlformats.org/drawingml/2006/main" xmlns:r="http://schemas.openxmlformats.org/officeDocument/2006/relationships" xmlns:p="http://schemas.openxmlformats.org/presentationml/2006/main">
+  <p:cSld>
+    <p:bg>
+      <p:bgPr>
+        <a:solidFill>
+          <a:schemeClr val="bg1"/>
+        </a:solidFill>
+        <a:effectLst/>
+      </p:bgPr>
+    </p:bg>
+    <p:spTree>
+      <p:nvGrpSpPr>
+        <p:cNvPr id="1" name=""/>
+        <p:cNvGrpSpPr/>
+        <p:nvPr/>
+      </p:nvGrpSpPr>
+      <p:grpSpPr>
+        <a:xfrm>
+          <a:off x="0" y="0"/>
+          <a:ext cx="0" cy="0"/>
+          <a:chOff x="0" y="0"/>
+          <a:chExt cx="0" cy="0"/>
+        </a:xfrm>
+      </p:grpSpPr>
+      <p:sp useBgFill="1">
+        <p:nvSpPr>
+          <p:cNvPr id="16" name="Rectangle 15">
+            <a:extLst>
+              <a:ext uri="{FF2B5EF4-FFF2-40B4-BE49-F238E27FC236}">
+                <a16:creationId xmlns:a16="http://schemas.microsoft.com/office/drawing/2014/main" id="{A3C210E6-A35A-4F68-8D60-801A019C75B8}"/>
+              </a:ext>
+              <a:ext uri="{C183D7F6-B498-43B3-948B-1728B52AA6E4}">
+                <adec:decorative xmlns:adec="http://schemas.microsoft.com/office/drawing/2017/decorative" val="1"/>
+              </a:ext>
+            </a:extLst>
+          </p:cNvPr>
+          <p:cNvSpPr>
+            <a:spLocks noGrp="1" noRot="1" noChangeAspect="1" noMove="1" noResize="1" noEditPoints="1" noAdjustHandles="1" noChangeArrowheads="1" noChangeShapeType="1" noTextEdit="1"/>
+          </p:cNvSpPr>
+          <p:nvPr>
+            <p:extLst>
+              <p:ext uri="{386F3935-93C4-4BCD-93E2-E3B085C9AB24}">
+                <p16:designElem xmlns:p16="http://schemas.microsoft.com/office/powerpoint/2015/main" val="1"/>
+              </p:ext>
+            </p:extLst>
+          </p:nvPr>
+        </p:nvSpPr>
+        <p:spPr>
+          <a:xfrm>
+            <a:off x="0" y="0"/>
+            <a:ext cx="12192000" cy="6858000"/>
+          </a:xfrm>
+          <a:prstGeom prst="rect">
+            <a:avLst/>
+          </a:prstGeom>
+          <a:ln>
+            <a:noFill/>
+          </a:ln>
+        </p:spPr>
+        <p:style>
+          <a:lnRef idx="2">
+            <a:schemeClr val="accent1">
+              <a:shade val="50000"/>
+            </a:schemeClr>
+          </a:lnRef>
+          <a:fillRef idx="1">
+            <a:schemeClr val="accent1"/>
+          </a:fillRef>
+          <a:effectRef idx="0">
+            <a:schemeClr val="accent1"/>
+          </a:effectRef>
+          <a:fontRef idx="minor">
+            <a:schemeClr val="lt1"/>
+          </a:fontRef>
+        </p:style>
+        <p:txBody>
+          <a:bodyPr rtlCol="0" anchor="ctr"/>
+          <a:lstStyle/>
+          <a:p>
+            <a:pPr algn="ctr"/>
+            <a:endParaRPr lang="en-US"/>
+          </a:p>
+        </p:txBody>
+      </p:sp>
+      <p:pic>
+        <p:nvPicPr>
+          <p:cNvPr id="5" name="Image 4" descr="Une image contenant peigne&#10;&#10;Description générée automatiquement">
+            <a:extLst>
+              <a:ext uri="{FF2B5EF4-FFF2-40B4-BE49-F238E27FC236}">
+                <a16:creationId xmlns:a16="http://schemas.microsoft.com/office/drawing/2014/main" id="{93526040-6544-42F1-897B-093F931E7C7E}"/>
+              </a:ext>
+            </a:extLst>
+          </p:cNvPr>
+          <p:cNvPicPr>
+            <a:picLocks noChangeAspect="1"/>
+          </p:cNvPicPr>
+          <p:nvPr/>
+        </p:nvPicPr>
+        <p:blipFill rotWithShape="1">
+          <a:blip r:embed="rId2">
+            <a:extLst>
+              <a:ext uri="{28A0092B-C50C-407E-A947-70E740481C1C}">
+                <a14:useLocalDpi xmlns:a14="http://schemas.microsoft.com/office/drawing/2010/main" val="0"/>
+              </a:ext>
+            </a:extLst>
+          </a:blip>
+          <a:srcRect t="588" r="2" b="5128"/>
+          <a:stretch/>
+        </p:blipFill>
+        <p:spPr>
+          <a:xfrm>
+            <a:off x="8500840" y="3897040"/>
+            <a:ext cx="2681831" cy="1896434"/>
+          </a:xfrm>
+          <a:custGeom>
+            <a:avLst/>
+            <a:gdLst/>
+            <a:ahLst/>
+            <a:cxnLst/>
+            <a:rect l="l" t="t" r="r" b="b"/>
+            <a:pathLst>
+              <a:path w="4810310" h="3401568">
+                <a:moveTo>
+                  <a:pt x="781270" y="0"/>
+                </a:moveTo>
+                <a:lnTo>
+                  <a:pt x="4810310" y="0"/>
+                </a:lnTo>
+                <a:lnTo>
+                  <a:pt x="4810310" y="3401568"/>
+                </a:lnTo>
+                <a:lnTo>
+                  <a:pt x="0" y="3401568"/>
+                </a:lnTo>
+                <a:lnTo>
+                  <a:pt x="1963" y="3397912"/>
+                </a:lnTo>
+                <a:cubicBezTo>
+                  <a:pt x="454182" y="2512619"/>
+                  <a:pt x="736170" y="1430108"/>
+                  <a:pt x="776876" y="254399"/>
+                </a:cubicBezTo>
+                <a:close/>
+              </a:path>
+            </a:pathLst>
+          </a:custGeom>
+        </p:spPr>
+      </p:pic>
+      <p:sp useBgFill="1">
+        <p:nvSpPr>
+          <p:cNvPr id="18" name="Freeform: Shape 17">
+            <a:extLst>
+              <a:ext uri="{FF2B5EF4-FFF2-40B4-BE49-F238E27FC236}">
+                <a16:creationId xmlns:a16="http://schemas.microsoft.com/office/drawing/2014/main" id="{AC0D06B0-F19C-459E-B221-A34B506FB5E3}"/>
+              </a:ext>
+              <a:ext uri="{C183D7F6-B498-43B3-948B-1728B52AA6E4}">
+                <adec:decorative xmlns:adec="http://schemas.microsoft.com/office/drawing/2017/decorative" val="1"/>
+              </a:ext>
+            </a:extLst>
+          </p:cNvPr>
+          <p:cNvSpPr>
+            <a:spLocks noGrp="1" noRot="1" noChangeAspect="1" noMove="1" noResize="1" noEditPoints="1" noAdjustHandles="1" noChangeArrowheads="1" noChangeShapeType="1" noTextEdit="1"/>
+          </p:cNvSpPr>
+          <p:nvPr>
+            <p:extLst>
+              <p:ext uri="{386F3935-93C4-4BCD-93E2-E3B085C9AB24}">
+                <p16:designElem xmlns:p16="http://schemas.microsoft.com/office/powerpoint/2015/main" val="1"/>
+              </p:ext>
+            </p:extLst>
+          </p:nvPr>
+        </p:nvSpPr>
+        <p:spPr>
+          <a:xfrm>
+            <a:off x="0" y="0"/>
+            <a:ext cx="3945815" cy="6858000"/>
+          </a:xfrm>
+          <a:custGeom>
+            <a:avLst/>
+            <a:gdLst>
+              <a:gd name="connsiteX0" fmla="*/ 0 w 3945815"/>
+              <a:gd name="connsiteY0" fmla="*/ 0 h 6858000"/>
+              <a:gd name="connsiteX1" fmla="*/ 3138662 w 3945815"/>
+              <a:gd name="connsiteY1" fmla="*/ 0 h 6858000"/>
+              <a:gd name="connsiteX2" fmla="*/ 3275260 w 3945815"/>
+              <a:gd name="connsiteY2" fmla="*/ 267438 h 6858000"/>
+              <a:gd name="connsiteX3" fmla="*/ 3945815 w 3945815"/>
+              <a:gd name="connsiteY3" fmla="*/ 3481388 h 6858000"/>
+              <a:gd name="connsiteX4" fmla="*/ 3275260 w 3945815"/>
+              <a:gd name="connsiteY4" fmla="*/ 6695338 h 6858000"/>
+              <a:gd name="connsiteX5" fmla="*/ 3192177 w 3945815"/>
+              <a:gd name="connsiteY5" fmla="*/ 6858000 h 6858000"/>
+              <a:gd name="connsiteX6" fmla="*/ 0 w 3945815"/>
+              <a:gd name="connsiteY6" fmla="*/ 6858000 h 6858000"/>
+            </a:gdLst>
+            <a:ahLst/>
+            <a:cxnLst>
+              <a:cxn ang="0">
+                <a:pos x="connsiteX0" y="connsiteY0"/>
+              </a:cxn>
+              <a:cxn ang="0">
+                <a:pos x="connsiteX1" y="connsiteY1"/>
+              </a:cxn>
+              <a:cxn ang="0">
+                <a:pos x="connsiteX2" y="connsiteY2"/>
+              </a:cxn>
+              <a:cxn ang="0">
+                <a:pos x="connsiteX3" y="connsiteY3"/>
+              </a:cxn>
+              <a:cxn ang="0">
+                <a:pos x="connsiteX4" y="connsiteY4"/>
+              </a:cxn>
+              <a:cxn ang="0">
+                <a:pos x="connsiteX5" y="connsiteY5"/>
+              </a:cxn>
+              <a:cxn ang="0">
+                <a:pos x="connsiteX6" y="connsiteY6"/>
+              </a:cxn>
+            </a:cxnLst>
+            <a:rect l="l" t="t" r="r" b="b"/>
+            <a:pathLst>
+              <a:path w="3945815" h="6858000">
+                <a:moveTo>
+                  <a:pt x="0" y="0"/>
+                </a:moveTo>
+                <a:lnTo>
+                  <a:pt x="3138662" y="0"/>
+                </a:lnTo>
+                <a:lnTo>
+                  <a:pt x="3275260" y="267438"/>
+                </a:lnTo>
+                <a:cubicBezTo>
+                  <a:pt x="3698614" y="1184879"/>
+                  <a:pt x="3945815" y="2290869"/>
+                  <a:pt x="3945815" y="3481388"/>
+                </a:cubicBezTo>
+                <a:cubicBezTo>
+                  <a:pt x="3945815" y="4671908"/>
+                  <a:pt x="3698614" y="5777898"/>
+                  <a:pt x="3275260" y="6695338"/>
+                </a:cubicBezTo>
+                <a:lnTo>
+                  <a:pt x="3192177" y="6858000"/>
+                </a:lnTo>
+                <a:lnTo>
+                  <a:pt x="0" y="6858000"/>
+                </a:lnTo>
+                <a:close/>
+              </a:path>
+            </a:pathLst>
+          </a:custGeom>
+          <a:ln w="9525">
+            <a:solidFill>
+              <a:srgbClr val="EFEFEF"/>
+            </a:solidFill>
+          </a:ln>
+          <a:effectLst>
+            <a:outerShdw blurRad="50800" dist="38100" algn="l" rotWithShape="0">
+              <a:schemeClr val="bg1">
+                <a:lumMod val="85000"/>
+                <a:alpha val="30000"/>
+              </a:schemeClr>
+            </a:outerShdw>
+          </a:effectLst>
+        </p:spPr>
+        <p:style>
+          <a:lnRef idx="2">
+            <a:schemeClr val="accent1">
+              <a:shade val="50000"/>
+            </a:schemeClr>
+          </a:lnRef>
+          <a:fillRef idx="1">
+            <a:schemeClr val="accent1"/>
+          </a:fillRef>
+          <a:effectRef idx="0">
+            <a:schemeClr val="accent1"/>
+          </a:effectRef>
+          <a:fontRef idx="minor">
+            <a:schemeClr val="lt1"/>
+          </a:fontRef>
+        </p:style>
+        <p:txBody>
+          <a:bodyPr wrap="square" rtlCol="0" anchor="ctr">
+            <a:noAutofit/>
+          </a:bodyPr>
+          <a:lstStyle/>
+          <a:p>
+            <a:pPr marL="0" marR="0" lvl="0" indent="0" algn="ctr" defTabSz="914400" rtl="0" eaLnBrk="1" fontAlgn="auto" latinLnBrk="0" hangingPunct="1">
+              <a:lnSpc>
+                <a:spcPct val="100000"/>
+              </a:lnSpc>
+              <a:spcBef>
+                <a:spcPts val="0"/>
+              </a:spcBef>
+              <a:spcAft>
+                <a:spcPts val="0"/>
+              </a:spcAft>
+              <a:buClrTx/>
+              <a:buSzTx/>
+              <a:buFontTx/>
+              <a:buNone/>
+              <a:tabLst/>
+              <a:defRPr/>
+            </a:pPr>
+            <a:endParaRPr kumimoji="0" lang="en-US" sz="1800" b="0" i="0" u="none" strike="noStrike" kern="1200" cap="none" spc="0" normalizeH="0" baseline="0" noProof="0">
+              <a:ln>
+                <a:noFill/>
+              </a:ln>
+              <a:solidFill>
+                <a:prstClr val="white"/>
+              </a:solidFill>
+              <a:effectLst/>
+              <a:uLnTx/>
+              <a:uFillTx/>
+              <a:latin typeface="Calibri" panose="020F0502020204030204"/>
+              <a:ea typeface="+mn-ea"/>
+              <a:cs typeface="+mn-cs"/>
+            </a:endParaRPr>
+          </a:p>
+        </p:txBody>
+      </p:sp>
+      <p:sp useBgFill="1">
+        <p:nvSpPr>
+          <p:cNvPr id="20" name="Freeform: Shape 19">
+            <a:extLst>
+              <a:ext uri="{FF2B5EF4-FFF2-40B4-BE49-F238E27FC236}">
+                <a16:creationId xmlns:a16="http://schemas.microsoft.com/office/drawing/2014/main" id="{345B26DA-1C6B-4C66-81C9-9C1877FC2DB1}"/>
+              </a:ext>
+              <a:ext uri="{C183D7F6-B498-43B3-948B-1728B52AA6E4}">
+                <adec:decorative xmlns:adec="http://schemas.microsoft.com/office/drawing/2017/decorative" val="1"/>
+              </a:ext>
+            </a:extLst>
+          </p:cNvPr>
+          <p:cNvSpPr>
+            <a:spLocks noGrp="1" noRot="1" noChangeAspect="1" noMove="1" noResize="1" noEditPoints="1" noAdjustHandles="1" noChangeArrowheads="1" noChangeShapeType="1" noTextEdit="1"/>
+          </p:cNvSpPr>
+          <p:nvPr>
+            <p:extLst>
+              <p:ext uri="{386F3935-93C4-4BCD-93E2-E3B085C9AB24}">
+                <p16:designElem xmlns:p16="http://schemas.microsoft.com/office/powerpoint/2015/main" val="1"/>
+              </p:ext>
+            </p:extLst>
+          </p:nvPr>
+        </p:nvSpPr>
+        <p:spPr>
+          <a:xfrm>
+            <a:off x="0" y="0"/>
+            <a:ext cx="3936670" cy="6858000"/>
+          </a:xfrm>
+          <a:custGeom>
+            <a:avLst/>
+            <a:gdLst>
+              <a:gd name="connsiteX0" fmla="*/ 0 w 3936670"/>
+              <a:gd name="connsiteY0" fmla="*/ 0 h 6858000"/>
+              <a:gd name="connsiteX1" fmla="*/ 3129517 w 3936670"/>
+              <a:gd name="connsiteY1" fmla="*/ 0 h 6858000"/>
+              <a:gd name="connsiteX2" fmla="*/ 3266115 w 3936670"/>
+              <a:gd name="connsiteY2" fmla="*/ 267438 h 6858000"/>
+              <a:gd name="connsiteX3" fmla="*/ 3936670 w 3936670"/>
+              <a:gd name="connsiteY3" fmla="*/ 3481388 h 6858000"/>
+              <a:gd name="connsiteX4" fmla="*/ 3266115 w 3936670"/>
+              <a:gd name="connsiteY4" fmla="*/ 6695338 h 6858000"/>
+              <a:gd name="connsiteX5" fmla="*/ 3183032 w 3936670"/>
+              <a:gd name="connsiteY5" fmla="*/ 6858000 h 6858000"/>
+              <a:gd name="connsiteX6" fmla="*/ 0 w 3936670"/>
+              <a:gd name="connsiteY6" fmla="*/ 6858000 h 6858000"/>
+            </a:gdLst>
+            <a:ahLst/>
+            <a:cxnLst>
+              <a:cxn ang="0">
+                <a:pos x="connsiteX0" y="connsiteY0"/>
+              </a:cxn>
+              <a:cxn ang="0">
+                <a:pos x="connsiteX1" y="connsiteY1"/>
+              </a:cxn>
+              <a:cxn ang="0">
+                <a:pos x="connsiteX2" y="connsiteY2"/>
+              </a:cxn>
+              <a:cxn ang="0">
+                <a:pos x="connsiteX3" y="connsiteY3"/>
+              </a:cxn>
+              <a:cxn ang="0">
+                <a:pos x="connsiteX4" y="connsiteY4"/>
+              </a:cxn>
+              <a:cxn ang="0">
+                <a:pos x="connsiteX5" y="connsiteY5"/>
+              </a:cxn>
+              <a:cxn ang="0">
+                <a:pos x="connsiteX6" y="connsiteY6"/>
+              </a:cxn>
+            </a:cxnLst>
+            <a:rect l="l" t="t" r="r" b="b"/>
+            <a:pathLst>
+              <a:path w="3936670" h="6858000">
+                <a:moveTo>
+                  <a:pt x="0" y="0"/>
+                </a:moveTo>
+                <a:lnTo>
+                  <a:pt x="3129517" y="0"/>
+                </a:lnTo>
+                <a:lnTo>
+                  <a:pt x="3266115" y="267438"/>
+                </a:lnTo>
+                <a:cubicBezTo>
+                  <a:pt x="3689469" y="1184879"/>
+                  <a:pt x="3936670" y="2290869"/>
+                  <a:pt x="3936670" y="3481388"/>
+                </a:cubicBezTo>
+                <a:cubicBezTo>
+                  <a:pt x="3936670" y="4671908"/>
+                  <a:pt x="3689469" y="5777898"/>
+                  <a:pt x="3266115" y="6695338"/>
+                </a:cubicBezTo>
+                <a:lnTo>
+                  <a:pt x="3183032" y="6858000"/>
+                </a:lnTo>
+                <a:lnTo>
+                  <a:pt x="0" y="6858000"/>
+                </a:lnTo>
+                <a:close/>
+              </a:path>
+            </a:pathLst>
+          </a:custGeom>
+          <a:ln w="9525">
+            <a:noFill/>
+          </a:ln>
+          <a:effectLst/>
+        </p:spPr>
+        <p:style>
+          <a:lnRef idx="2">
+            <a:schemeClr val="accent1">
+              <a:shade val="50000"/>
+            </a:schemeClr>
+          </a:lnRef>
+          <a:fillRef idx="1">
+            <a:schemeClr val="accent1"/>
+          </a:fillRef>
+          <a:effectRef idx="0">
+            <a:schemeClr val="accent1"/>
+          </a:effectRef>
+          <a:fontRef idx="minor">
+            <a:schemeClr val="lt1"/>
+          </a:fontRef>
+        </p:style>
+        <p:txBody>
+          <a:bodyPr wrap="square" rtlCol="0" anchor="ctr">
+            <a:noAutofit/>
+          </a:bodyPr>
+          <a:lstStyle/>
+          <a:p>
+            <a:pPr marL="0" marR="0" lvl="0" indent="0" algn="ctr" defTabSz="914400" rtl="0" eaLnBrk="1" fontAlgn="auto" latinLnBrk="0" hangingPunct="1">
+              <a:lnSpc>
+                <a:spcPct val="100000"/>
+              </a:lnSpc>
+              <a:spcBef>
+                <a:spcPts val="0"/>
+              </a:spcBef>
+              <a:spcAft>
+                <a:spcPts val="0"/>
+              </a:spcAft>
+              <a:buClrTx/>
+              <a:buSzTx/>
+              <a:buFontTx/>
+              <a:buNone/>
+              <a:tabLst/>
+              <a:defRPr/>
+            </a:pPr>
+            <a:endParaRPr kumimoji="0" lang="en-US" sz="1800" b="0" i="0" u="none" strike="noStrike" kern="1200" cap="none" spc="0" normalizeH="0" baseline="0" noProof="0">
+              <a:ln>
+                <a:noFill/>
+              </a:ln>
+              <a:solidFill>
+                <a:prstClr val="white"/>
+              </a:solidFill>
+              <a:effectLst/>
+              <a:uLnTx/>
+              <a:uFillTx/>
+              <a:latin typeface="Calibri" panose="020F0502020204030204"/>
+              <a:ea typeface="+mn-ea"/>
+              <a:cs typeface="+mn-cs"/>
+            </a:endParaRPr>
+          </a:p>
+        </p:txBody>
+      </p:sp>
+      <p:sp>
+        <p:nvSpPr>
+          <p:cNvPr id="2" name="Titre 1">
+            <a:extLst>
+              <a:ext uri="{FF2B5EF4-FFF2-40B4-BE49-F238E27FC236}">
+                <a16:creationId xmlns:a16="http://schemas.microsoft.com/office/drawing/2014/main" id="{753FDD7F-D538-47F2-9095-2E28E0BC8E74}"/>
+              </a:ext>
+            </a:extLst>
+          </p:cNvPr>
+          <p:cNvSpPr>
+            <a:spLocks noGrp="1"/>
+          </p:cNvSpPr>
+          <p:nvPr>
+            <p:ph type="title"/>
+          </p:nvPr>
+        </p:nvSpPr>
+        <p:spPr>
+          <a:xfrm>
+            <a:off x="448056" y="685800"/>
+            <a:ext cx="2807208" cy="1325563"/>
+          </a:xfrm>
+        </p:spPr>
+        <p:txBody>
+          <a:bodyPr>
+            <a:normAutofit/>
+          </a:bodyPr>
+          <a:lstStyle/>
+          <a:p>
+            <a:r>
+              <a:rPr lang="fr-FR" sz="2800"/>
+              <a:t>Tentative d’application d’un masque(1,2,3)</a:t>
+            </a:r>
+          </a:p>
+        </p:txBody>
+      </p:sp>
+      <p:sp>
+        <p:nvSpPr>
+          <p:cNvPr id="22" name="Rectangle 21">
+            <a:extLst>
+              <a:ext uri="{FF2B5EF4-FFF2-40B4-BE49-F238E27FC236}">
+                <a16:creationId xmlns:a16="http://schemas.microsoft.com/office/drawing/2014/main" id="{98DE6C44-43F8-4DE4-AB81-66853FFEA09A}"/>
+              </a:ext>
+              <a:ext uri="{C183D7F6-B498-43B3-948B-1728B52AA6E4}">
+                <adec:decorative xmlns:adec="http://schemas.microsoft.com/office/drawing/2017/decorative" val="1"/>
+              </a:ext>
+            </a:extLst>
+          </p:cNvPr>
+          <p:cNvSpPr>
+            <a:spLocks noGrp="1" noRot="1" noChangeAspect="1" noMove="1" noResize="1" noEditPoints="1" noAdjustHandles="1" noChangeArrowheads="1" noChangeShapeType="1" noTextEdit="1"/>
+          </p:cNvSpPr>
+          <p:nvPr>
+            <p:extLst>
+              <p:ext uri="{386F3935-93C4-4BCD-93E2-E3B085C9AB24}">
+                <p16:designElem xmlns:p16="http://schemas.microsoft.com/office/powerpoint/2015/main" val="1"/>
+              </p:ext>
+            </p:extLst>
+          </p:nvPr>
+        </p:nvSpPr>
+        <p:spPr>
+          <a:xfrm>
+            <a:off x="0" y="1005840"/>
+            <a:ext cx="128016" cy="653903"/>
+          </a:xfrm>
+          <a:prstGeom prst="rect">
+            <a:avLst/>
+          </a:prstGeom>
+          <a:solidFill>
+            <a:schemeClr val="accent2"/>
+          </a:solidFill>
+          <a:ln>
+            <a:noFill/>
+          </a:ln>
+        </p:spPr>
+        <p:style>
+          <a:lnRef idx="2">
+            <a:schemeClr val="accent1">
+              <a:shade val="50000"/>
+            </a:schemeClr>
+          </a:lnRef>
+          <a:fillRef idx="1">
+            <a:schemeClr val="accent1"/>
+          </a:fillRef>
+          <a:effectRef idx="0">
+            <a:schemeClr val="accent1"/>
+          </a:effectRef>
+          <a:fontRef idx="minor">
+            <a:schemeClr val="lt1"/>
+          </a:fontRef>
+        </p:style>
+        <p:txBody>
+          <a:bodyPr rtlCol="0" anchor="ctr"/>
+          <a:lstStyle/>
+          <a:p>
+            <a:pPr marL="0" marR="0" lvl="0" indent="0" algn="ctr" defTabSz="914400" rtl="0" eaLnBrk="1" fontAlgn="auto" latinLnBrk="0" hangingPunct="1">
+              <a:lnSpc>
+                <a:spcPct val="100000"/>
+              </a:lnSpc>
+              <a:spcBef>
+                <a:spcPts val="0"/>
+              </a:spcBef>
+              <a:spcAft>
+                <a:spcPts val="0"/>
+              </a:spcAft>
+              <a:buClrTx/>
+              <a:buSzTx/>
+              <a:buFontTx/>
+              <a:buNone/>
+              <a:tabLst/>
+              <a:defRPr/>
+            </a:pPr>
+            <a:endParaRPr kumimoji="0" lang="en-US" sz="1800" b="0" i="0" u="none" strike="noStrike" kern="1200" cap="none" spc="0" normalizeH="0" baseline="0" noProof="0">
+              <a:ln>
+                <a:noFill/>
+              </a:ln>
+              <a:solidFill>
+                <a:prstClr val="white"/>
+              </a:solidFill>
+              <a:effectLst/>
+              <a:uLnTx/>
+              <a:uFillTx/>
+              <a:latin typeface="Calibri" panose="020F0502020204030204"/>
+              <a:ea typeface="+mn-ea"/>
+              <a:cs typeface="+mn-cs"/>
+            </a:endParaRPr>
+          </a:p>
+        </p:txBody>
+      </p:sp>
+      <p:sp>
+        <p:nvSpPr>
+          <p:cNvPr id="24" name="Rectangle 23">
+            <a:extLst>
+              <a:ext uri="{FF2B5EF4-FFF2-40B4-BE49-F238E27FC236}">
+                <a16:creationId xmlns:a16="http://schemas.microsoft.com/office/drawing/2014/main" id="{2409529B-9B56-4F10-BE4D-F934DB89E57E}"/>
+              </a:ext>
+              <a:ext uri="{C183D7F6-B498-43B3-948B-1728B52AA6E4}">
+                <adec:decorative xmlns:adec="http://schemas.microsoft.com/office/drawing/2017/decorative" val="1"/>
+              </a:ext>
+            </a:extLst>
+          </p:cNvPr>
+          <p:cNvSpPr>
+            <a:spLocks noGrp="1" noRot="1" noChangeAspect="1" noMove="1" noResize="1" noEditPoints="1" noAdjustHandles="1" noChangeArrowheads="1" noChangeShapeType="1" noTextEdit="1"/>
+          </p:cNvSpPr>
+          <p:nvPr>
+            <p:extLst>
+              <p:ext uri="{386F3935-93C4-4BCD-93E2-E3B085C9AB24}">
+                <p16:designElem xmlns:p16="http://schemas.microsoft.com/office/powerpoint/2015/main" val="1"/>
+              </p:ext>
+            </p:extLst>
+          </p:nvPr>
+        </p:nvSpPr>
+        <p:spPr>
+          <a:xfrm>
+            <a:off x="438912" y="2089941"/>
+            <a:ext cx="2834640" cy="18288"/>
+          </a:xfrm>
+          <a:prstGeom prst="rect">
+            <a:avLst/>
+          </a:prstGeom>
+          <a:solidFill>
+            <a:srgbClr val="D5D5D5"/>
+          </a:solidFill>
+          <a:ln w="3175">
+            <a:noFill/>
+          </a:ln>
+          <a:effectLst/>
+        </p:spPr>
+        <p:style>
+          <a:lnRef idx="2">
+            <a:schemeClr val="accent1">
+              <a:shade val="50000"/>
+            </a:schemeClr>
+          </a:lnRef>
+          <a:fillRef idx="1">
+            <a:schemeClr val="accent1"/>
+          </a:fillRef>
+          <a:effectRef idx="0">
+            <a:schemeClr val="accent1"/>
+          </a:effectRef>
+          <a:fontRef idx="minor">
+            <a:schemeClr val="lt1"/>
+          </a:fontRef>
+        </p:style>
+        <p:txBody>
+          <a:bodyPr rtlCol="0" anchor="ctr"/>
+          <a:lstStyle/>
+          <a:p>
+            <a:pPr marL="0" marR="0" lvl="0" indent="0" algn="ctr" defTabSz="914400" rtl="0" eaLnBrk="1" fontAlgn="auto" latinLnBrk="0" hangingPunct="1">
+              <a:lnSpc>
+                <a:spcPct val="100000"/>
+              </a:lnSpc>
+              <a:spcBef>
+                <a:spcPts val="0"/>
+              </a:spcBef>
+              <a:spcAft>
+                <a:spcPts val="0"/>
+              </a:spcAft>
+              <a:buClrTx/>
+              <a:buSzTx/>
+              <a:buFontTx/>
+              <a:buNone/>
+              <a:tabLst/>
+              <a:defRPr/>
+            </a:pPr>
+            <a:endParaRPr kumimoji="0" lang="en-US" sz="1800" b="0" i="0" u="none" strike="noStrike" kern="1200" cap="none" spc="0" normalizeH="0" baseline="0" noProof="0">
+              <a:ln>
+                <a:noFill/>
+              </a:ln>
+              <a:solidFill>
+                <a:prstClr val="white"/>
+              </a:solidFill>
+              <a:effectLst/>
+              <a:uLnTx/>
+              <a:uFillTx/>
+              <a:latin typeface="Calibri" panose="020F0502020204030204"/>
+              <a:ea typeface="+mn-ea"/>
+              <a:cs typeface="+mn-cs"/>
+            </a:endParaRPr>
+          </a:p>
+        </p:txBody>
+      </p:sp>
+      <p:sp>
+        <p:nvSpPr>
+          <p:cNvPr id="3" name="Espace réservé du contenu 2">
+            <a:extLst>
+              <a:ext uri="{FF2B5EF4-FFF2-40B4-BE49-F238E27FC236}">
+                <a16:creationId xmlns:a16="http://schemas.microsoft.com/office/drawing/2014/main" id="{CAFD1553-D923-4587-9C6E-E6B3C48D917A}"/>
+              </a:ext>
+            </a:extLst>
+          </p:cNvPr>
+          <p:cNvSpPr>
+            <a:spLocks noGrp="1"/>
+          </p:cNvSpPr>
+          <p:nvPr>
+            <p:ph idx="1"/>
+          </p:nvPr>
+        </p:nvSpPr>
+        <p:spPr>
+          <a:xfrm>
+            <a:off x="448056" y="2258568"/>
+            <a:ext cx="2807208" cy="3922776"/>
+          </a:xfrm>
+        </p:spPr>
+        <p:txBody>
+          <a:bodyPr>
+            <a:normAutofit/>
+          </a:bodyPr>
+          <a:lstStyle/>
+          <a:p>
+            <a:r>
+              <a:rPr lang="fr-FR" sz="1700"/>
+              <a:t>Masque 2 sur code barre d’un pot de nutella </a:t>
+            </a:r>
+          </a:p>
+          <a:p>
+            <a:pPr marL="0" indent="0">
+              <a:buNone/>
+            </a:pPr>
+            <a:endParaRPr lang="fr-FR" sz="1700"/>
+          </a:p>
+        </p:txBody>
+      </p:sp>
+      <p:pic>
+        <p:nvPicPr>
+          <p:cNvPr id="7" name="Image 6" descr="Une image contenant horloge, peigne, garé&#10;&#10;Description générée automatiquement">
+            <a:extLst>
+              <a:ext uri="{FF2B5EF4-FFF2-40B4-BE49-F238E27FC236}">
+                <a16:creationId xmlns:a16="http://schemas.microsoft.com/office/drawing/2014/main" id="{78961FF4-E4B2-41F9-B4F3-6063C22C382F}"/>
+              </a:ext>
+            </a:extLst>
+          </p:cNvPr>
+          <p:cNvPicPr>
+            <a:picLocks noChangeAspect="1"/>
+          </p:cNvPicPr>
+          <p:nvPr/>
+        </p:nvPicPr>
+        <p:blipFill rotWithShape="1">
+          <a:blip r:embed="rId3">
+            <a:extLst>
+              <a:ext uri="{28A0092B-C50C-407E-A947-70E740481C1C}">
+                <a14:useLocalDpi xmlns:a14="http://schemas.microsoft.com/office/drawing/2010/main" val="0"/>
+              </a:ext>
+            </a:extLst>
+          </a:blip>
+          <a:srcRect t="5268" r="-1" b="-1"/>
+          <a:stretch/>
+        </p:blipFill>
+        <p:spPr>
+          <a:xfrm>
+            <a:off x="7404372" y="10"/>
+            <a:ext cx="4787628" cy="3401558"/>
+          </a:xfrm>
+          <a:custGeom>
+            <a:avLst/>
+            <a:gdLst/>
+            <a:ahLst/>
+            <a:cxnLst/>
+            <a:rect l="l" t="t" r="r" b="b"/>
+            <a:pathLst>
+              <a:path w="4787628" h="3401568">
+                <a:moveTo>
+                  <a:pt x="0" y="0"/>
+                </a:moveTo>
+                <a:lnTo>
+                  <a:pt x="4787628" y="0"/>
+                </a:lnTo>
+                <a:lnTo>
+                  <a:pt x="4787628" y="3401568"/>
+                </a:lnTo>
+                <a:lnTo>
+                  <a:pt x="762748" y="3401568"/>
+                </a:lnTo>
+                <a:lnTo>
+                  <a:pt x="751436" y="2963954"/>
+                </a:lnTo>
+                <a:cubicBezTo>
+                  <a:pt x="698408" y="1942163"/>
+                  <a:pt x="463174" y="995044"/>
+                  <a:pt x="93264" y="192283"/>
+                </a:cubicBezTo>
+                <a:close/>
+              </a:path>
+            </a:pathLst>
+          </a:custGeom>
+        </p:spPr>
+      </p:pic>
+      <p:pic>
+        <p:nvPicPr>
+          <p:cNvPr id="13" name="Image 12">
+            <a:extLst>
+              <a:ext uri="{FF2B5EF4-FFF2-40B4-BE49-F238E27FC236}">
+                <a16:creationId xmlns:a16="http://schemas.microsoft.com/office/drawing/2014/main" id="{30DFC1D1-AB14-4176-935D-57A1ED3EEDDB}"/>
+              </a:ext>
+            </a:extLst>
+          </p:cNvPr>
+          <p:cNvPicPr>
+            <a:picLocks noChangeAspect="1"/>
+          </p:cNvPicPr>
+          <p:nvPr/>
+        </p:nvPicPr>
+        <p:blipFill>
+          <a:blip r:embed="rId4">
+            <a:extLst>
+              <a:ext uri="{28A0092B-C50C-407E-A947-70E740481C1C}">
+                <a14:useLocalDpi xmlns:a14="http://schemas.microsoft.com/office/drawing/2010/main" val="0"/>
+              </a:ext>
+            </a:extLst>
+          </a:blip>
+          <a:stretch>
+            <a:fillRect/>
+          </a:stretch>
+        </p:blipFill>
+        <p:spPr>
+          <a:xfrm>
+            <a:off x="4303863" y="263299"/>
+            <a:ext cx="3403402" cy="1995269"/>
+          </a:xfrm>
+          <a:prstGeom prst="rect">
+            <a:avLst/>
+          </a:prstGeom>
+        </p:spPr>
+      </p:pic>
+      <p:pic>
+        <p:nvPicPr>
+          <p:cNvPr id="15" name="Image 14">
+            <a:extLst>
+              <a:ext uri="{FF2B5EF4-FFF2-40B4-BE49-F238E27FC236}">
+                <a16:creationId xmlns:a16="http://schemas.microsoft.com/office/drawing/2014/main" id="{5EC3F336-D98E-49D0-B197-BAE794FDE897}"/>
+              </a:ext>
+            </a:extLst>
+          </p:cNvPr>
+          <p:cNvPicPr>
+            <a:picLocks noChangeAspect="1"/>
+          </p:cNvPicPr>
+          <p:nvPr/>
+        </p:nvPicPr>
+        <p:blipFill>
+          <a:blip r:embed="rId4">
+            <a:extLst>
+              <a:ext uri="{28A0092B-C50C-407E-A947-70E740481C1C}">
+                <a14:useLocalDpi xmlns:a14="http://schemas.microsoft.com/office/drawing/2010/main" val="0"/>
+              </a:ext>
+            </a:extLst>
+          </a:blip>
+          <a:stretch>
+            <a:fillRect/>
+          </a:stretch>
+        </p:blipFill>
+        <p:spPr>
+          <a:xfrm>
+            <a:off x="4303864" y="4101718"/>
+            <a:ext cx="3403401" cy="1995269"/>
+          </a:xfrm>
+          <a:prstGeom prst="rect">
+            <a:avLst/>
+          </a:prstGeom>
+        </p:spPr>
+      </p:pic>
+      <p:sp>
+        <p:nvSpPr>
+          <p:cNvPr id="17" name="ZoneTexte 16">
+            <a:extLst>
+              <a:ext uri="{FF2B5EF4-FFF2-40B4-BE49-F238E27FC236}">
+                <a16:creationId xmlns:a16="http://schemas.microsoft.com/office/drawing/2014/main" id="{15B81695-6C4F-4AE9-BEBE-74F1E68EECF9}"/>
+              </a:ext>
+            </a:extLst>
+          </p:cNvPr>
+          <p:cNvSpPr txBox="1"/>
+          <p:nvPr/>
+        </p:nvSpPr>
+        <p:spPr>
+          <a:xfrm>
+            <a:off x="5097439" y="5793475"/>
+            <a:ext cx="1926202" cy="369332"/>
+          </a:xfrm>
+          <a:prstGeom prst="rect">
+            <a:avLst/>
+          </a:prstGeom>
+          <a:noFill/>
+        </p:spPr>
+        <p:txBody>
+          <a:bodyPr wrap="square" rtlCol="0">
+            <a:spAutoFit/>
+          </a:bodyPr>
+          <a:lstStyle/>
+          <a:p>
+            <a:r>
+              <a:rPr lang="fr-FR" dirty="0"/>
+              <a:t>Seuillage adaptive</a:t>
+            </a:r>
+          </a:p>
+        </p:txBody>
+      </p:sp>
+      <p:sp>
+        <p:nvSpPr>
+          <p:cNvPr id="19" name="ZoneTexte 18">
+            <a:extLst>
+              <a:ext uri="{FF2B5EF4-FFF2-40B4-BE49-F238E27FC236}">
+                <a16:creationId xmlns:a16="http://schemas.microsoft.com/office/drawing/2014/main" id="{771D4F52-91EE-4112-AB53-BBA766F78589}"/>
+              </a:ext>
+            </a:extLst>
+          </p:cNvPr>
+          <p:cNvSpPr txBox="1"/>
+          <p:nvPr/>
+        </p:nvSpPr>
+        <p:spPr>
+          <a:xfrm>
+            <a:off x="5156375" y="1576317"/>
+            <a:ext cx="1808329" cy="369332"/>
+          </a:xfrm>
+          <a:prstGeom prst="rect">
+            <a:avLst/>
+          </a:prstGeom>
+          <a:noFill/>
+        </p:spPr>
+        <p:txBody>
+          <a:bodyPr wrap="square" rtlCol="0">
+            <a:spAutoFit/>
+          </a:bodyPr>
+          <a:lstStyle/>
+          <a:p>
+            <a:r>
+              <a:rPr lang="fr-FR" dirty="0"/>
+              <a:t>Seuillage général</a:t>
+            </a:r>
+          </a:p>
+        </p:txBody>
+      </p:sp>
+      <p:sp>
+        <p:nvSpPr>
+          <p:cNvPr id="21" name="ZoneTexte 20">
+            <a:extLst>
+              <a:ext uri="{FF2B5EF4-FFF2-40B4-BE49-F238E27FC236}">
+                <a16:creationId xmlns:a16="http://schemas.microsoft.com/office/drawing/2014/main" id="{CBA3F882-073A-442F-AEA8-881D6ADCDB34}"/>
+              </a:ext>
+            </a:extLst>
+          </p:cNvPr>
+          <p:cNvSpPr txBox="1"/>
+          <p:nvPr/>
+        </p:nvSpPr>
+        <p:spPr>
+          <a:xfrm>
+            <a:off x="8648796" y="5812012"/>
+            <a:ext cx="3473355" cy="369332"/>
+          </a:xfrm>
+          <a:prstGeom prst="rect">
+            <a:avLst/>
+          </a:prstGeom>
+          <a:noFill/>
+        </p:spPr>
+        <p:txBody>
+          <a:bodyPr wrap="square" rtlCol="0">
+            <a:spAutoFit/>
+          </a:bodyPr>
+          <a:lstStyle/>
+          <a:p>
+            <a:r>
+              <a:rPr lang="fr-FR" dirty="0"/>
+              <a:t>Masque 2 appliqué </a:t>
+            </a:r>
+          </a:p>
+        </p:txBody>
+      </p:sp>
+      <p:sp>
+        <p:nvSpPr>
+          <p:cNvPr id="23" name="ZoneTexte 22">
+            <a:extLst>
+              <a:ext uri="{FF2B5EF4-FFF2-40B4-BE49-F238E27FC236}">
+                <a16:creationId xmlns:a16="http://schemas.microsoft.com/office/drawing/2014/main" id="{9D27E1A4-4DE4-4572-8F52-5BD82E9E3B21}"/>
+              </a:ext>
+            </a:extLst>
+          </p:cNvPr>
+          <p:cNvSpPr txBox="1"/>
+          <p:nvPr/>
+        </p:nvSpPr>
+        <p:spPr>
+          <a:xfrm>
+            <a:off x="7910574" y="3271767"/>
+            <a:ext cx="3862362" cy="369332"/>
+          </a:xfrm>
+          <a:prstGeom prst="rect">
+            <a:avLst/>
+          </a:prstGeom>
+          <a:noFill/>
+        </p:spPr>
+        <p:txBody>
+          <a:bodyPr wrap="square" rtlCol="0">
+            <a:spAutoFit/>
+          </a:bodyPr>
+          <a:lstStyle/>
+          <a:p>
+            <a:r>
+              <a:rPr lang="fr-FR" dirty="0"/>
+              <a:t>Conversion de l’image de base en </a:t>
+            </a:r>
+            <a:r>
+              <a:rPr lang="fr-FR" dirty="0" err="1"/>
+              <a:t>ndg</a:t>
+            </a:r>
+            <a:r>
+              <a:rPr lang="fr-FR" dirty="0"/>
+              <a:t> </a:t>
+            </a:r>
+          </a:p>
+        </p:txBody>
+      </p:sp>
+    </p:spTree>
+    <p:extLst>
+      <p:ext uri="{BB962C8B-B14F-4D97-AF65-F5344CB8AC3E}">
+        <p14:creationId xmlns:p14="http://schemas.microsoft.com/office/powerpoint/2010/main" val="4168746171"/>
+      </p:ext>
+    </p:extLst>
+  </p:cSld>
+  <p:clrMapOvr>
+    <a:masterClrMapping/>
+  </p:clrMapOvr>
+</p:sld>
+</file>
+
 <file path=ppt/theme/theme1.xml><?xml version="1.0" encoding="utf-8"?>
 <a:theme xmlns:a="http://schemas.openxmlformats.org/drawingml/2006/main" name="Thème Office">
   <a:themeElements>

</xml_diff>